<commit_message>
Update 2019 Meet-The-Team Meeting.pptx
</commit_message>
<xml_diff>
--- a/Reports and Presentations/Presentations/2019-2020/Intro Meeting/2019 Meet-The-Team Meeting.pptx
+++ b/Reports and Presentations/Presentations/2019-2020/Intro Meeting/2019 Meet-The-Team Meeting.pptx
@@ -3534,7 +3534,7 @@
           <a:p>
             <a:fld id="{79C6A49C-1803-4A28-8D90-751DD6DAEE6E}" type="datetimeFigureOut">
               <a:rPr lang="en-US" smtClean="0"/>
-              <a:t>9/15/2019</a:t>
+              <a:t>9/16/2019</a:t>
             </a:fld>
             <a:endParaRPr lang="en-US"/>
           </a:p>
@@ -4526,7 +4526,7 @@
           <a:p>
             <a:fld id="{DC4FF77B-AB05-463F-8388-E3EF4DCD9159}" type="datetimeFigureOut">
               <a:rPr lang="en-US" smtClean="0"/>
-              <a:t>9/15/2019</a:t>
+              <a:t>9/16/2019</a:t>
             </a:fld>
             <a:endParaRPr lang="en-US"/>
           </a:p>
@@ -4824,7 +4824,7 @@
           <a:p>
             <a:fld id="{DC4FF77B-AB05-463F-8388-E3EF4DCD9159}" type="datetimeFigureOut">
               <a:rPr lang="en-US" smtClean="0"/>
-              <a:t>9/15/2019</a:t>
+              <a:t>9/16/2019</a:t>
             </a:fld>
             <a:endParaRPr lang="en-US"/>
           </a:p>
@@ -5016,7 +5016,7 @@
           <a:p>
             <a:fld id="{DC4FF77B-AB05-463F-8388-E3EF4DCD9159}" type="datetimeFigureOut">
               <a:rPr lang="en-US" smtClean="0"/>
-              <a:t>9/15/2019</a:t>
+              <a:t>9/16/2019</a:t>
             </a:fld>
             <a:endParaRPr lang="en-US"/>
           </a:p>
@@ -5277,7 +5277,7 @@
           <a:p>
             <a:fld id="{DC4FF77B-AB05-463F-8388-E3EF4DCD9159}" type="datetimeFigureOut">
               <a:rPr lang="en-US" smtClean="0"/>
-              <a:t>9/15/2019</a:t>
+              <a:t>9/16/2019</a:t>
             </a:fld>
             <a:endParaRPr lang="en-US"/>
           </a:p>
@@ -5701,7 +5701,7 @@
           <a:p>
             <a:fld id="{DC4FF77B-AB05-463F-8388-E3EF4DCD9159}" type="datetimeFigureOut">
               <a:rPr lang="en-US" smtClean="0"/>
-              <a:t>9/15/2019</a:t>
+              <a:t>9/16/2019</a:t>
             </a:fld>
             <a:endParaRPr lang="en-US"/>
           </a:p>
@@ -6238,7 +6238,7 @@
           <a:p>
             <a:fld id="{DC4FF77B-AB05-463F-8388-E3EF4DCD9159}" type="datetimeFigureOut">
               <a:rPr lang="en-US" smtClean="0"/>
-              <a:t>9/15/2019</a:t>
+              <a:t>9/16/2019</a:t>
             </a:fld>
             <a:endParaRPr lang="en-US"/>
           </a:p>
@@ -7102,7 +7102,7 @@
           <a:p>
             <a:fld id="{DC4FF77B-AB05-463F-8388-E3EF4DCD9159}" type="datetimeFigureOut">
               <a:rPr lang="en-US" smtClean="0"/>
-              <a:t>9/15/2019</a:t>
+              <a:t>9/16/2019</a:t>
             </a:fld>
             <a:endParaRPr lang="en-US"/>
           </a:p>
@@ -7272,7 +7272,7 @@
           <a:p>
             <a:fld id="{DC4FF77B-AB05-463F-8388-E3EF4DCD9159}" type="datetimeFigureOut">
               <a:rPr lang="en-US" smtClean="0"/>
-              <a:t>9/15/2019</a:t>
+              <a:t>9/16/2019</a:t>
             </a:fld>
             <a:endParaRPr lang="en-US"/>
           </a:p>
@@ -7456,7 +7456,7 @@
           <a:p>
             <a:fld id="{DC4FF77B-AB05-463F-8388-E3EF4DCD9159}" type="datetimeFigureOut">
               <a:rPr lang="en-US" smtClean="0"/>
-              <a:t>9/15/2019</a:t>
+              <a:t>9/16/2019</a:t>
             </a:fld>
             <a:endParaRPr lang="en-US"/>
           </a:p>
@@ -7626,7 +7626,7 @@
           <a:p>
             <a:fld id="{DC4FF77B-AB05-463F-8388-E3EF4DCD9159}" type="datetimeFigureOut">
               <a:rPr lang="en-US" smtClean="0"/>
-              <a:t>9/15/2019</a:t>
+              <a:t>9/16/2019</a:t>
             </a:fld>
             <a:endParaRPr lang="en-US"/>
           </a:p>
@@ -7870,7 +7870,7 @@
           <a:p>
             <a:fld id="{DC4FF77B-AB05-463F-8388-E3EF4DCD9159}" type="datetimeFigureOut">
               <a:rPr lang="en-US" smtClean="0"/>
-              <a:t>9/15/2019</a:t>
+              <a:t>9/16/2019</a:t>
             </a:fld>
             <a:endParaRPr lang="en-US"/>
           </a:p>
@@ -8106,7 +8106,7 @@
           <a:p>
             <a:fld id="{DC4FF77B-AB05-463F-8388-E3EF4DCD9159}" type="datetimeFigureOut">
               <a:rPr lang="en-US" smtClean="0"/>
-              <a:t>9/15/2019</a:t>
+              <a:t>9/16/2019</a:t>
             </a:fld>
             <a:endParaRPr lang="en-US"/>
           </a:p>
@@ -8572,7 +8572,7 @@
           <a:p>
             <a:fld id="{DC4FF77B-AB05-463F-8388-E3EF4DCD9159}" type="datetimeFigureOut">
               <a:rPr lang="en-US" smtClean="0"/>
-              <a:t>9/15/2019</a:t>
+              <a:t>9/16/2019</a:t>
             </a:fld>
             <a:endParaRPr lang="en-US"/>
           </a:p>
@@ -8690,7 +8690,7 @@
           <a:p>
             <a:fld id="{DC4FF77B-AB05-463F-8388-E3EF4DCD9159}" type="datetimeFigureOut">
               <a:rPr lang="en-US" smtClean="0"/>
-              <a:t>9/15/2019</a:t>
+              <a:t>9/16/2019</a:t>
             </a:fld>
             <a:endParaRPr lang="en-US"/>
           </a:p>
@@ -8785,7 +8785,7 @@
           <a:p>
             <a:fld id="{DC4FF77B-AB05-463F-8388-E3EF4DCD9159}" type="datetimeFigureOut">
               <a:rPr lang="en-US" smtClean="0"/>
-              <a:t>9/15/2019</a:t>
+              <a:t>9/16/2019</a:t>
             </a:fld>
             <a:endParaRPr lang="en-US"/>
           </a:p>
@@ -9040,7 +9040,7 @@
           <a:p>
             <a:fld id="{DC4FF77B-AB05-463F-8388-E3EF4DCD9159}" type="datetimeFigureOut">
               <a:rPr lang="en-US" smtClean="0"/>
-              <a:t>9/15/2019</a:t>
+              <a:t>9/16/2019</a:t>
             </a:fld>
             <a:endParaRPr lang="en-US"/>
           </a:p>
@@ -9340,7 +9340,7 @@
           <a:p>
             <a:fld id="{DC4FF77B-AB05-463F-8388-E3EF4DCD9159}" type="datetimeFigureOut">
               <a:rPr lang="en-US" smtClean="0"/>
-              <a:t>9/15/2019</a:t>
+              <a:t>9/16/2019</a:t>
             </a:fld>
             <a:endParaRPr lang="en-US"/>
           </a:p>
@@ -9574,7 +9574,7 @@
           <a:p>
             <a:fld id="{DC4FF77B-AB05-463F-8388-E3EF4DCD9159}" type="datetimeFigureOut">
               <a:rPr lang="en-US" smtClean="0"/>
-              <a:t>9/15/2019</a:t>
+              <a:t>9/16/2019</a:t>
             </a:fld>
             <a:endParaRPr lang="en-US"/>
           </a:p>
@@ -10738,7 +10738,6 @@
                 <a:tint val="98000"/>
               </a:schemeClr>
             </a:duotone>
-            <a:extLst/>
           </a:blip>
           <a:stretch/>
         </a:blipFill>
@@ -11356,7 +11355,6 @@
                 <a:tint val="98000"/>
               </a:schemeClr>
             </a:duotone>
-            <a:extLst/>
           </a:blip>
           <a:stretch/>
         </a:blipFill>
@@ -12137,13 +12135,8 @@
             </a:pPr>
             <a:r>
               <a:rPr lang="en-US" dirty="0"/>
-              <a:t>Get to know </a:t>
+              <a:t>Get to know each other</a:t>
             </a:r>
-            <a:r>
-              <a:rPr lang="en-US" dirty="0" err="1"/>
-              <a:t>eachother</a:t>
-            </a:r>
-            <a:endParaRPr lang="en-US" dirty="0"/>
           </a:p>
         </p:txBody>
       </p:sp>
@@ -12176,7 +12169,6 @@
                 <a:tint val="98000"/>
               </a:schemeClr>
             </a:duotone>
-            <a:extLst/>
           </a:blip>
           <a:stretch/>
         </a:blipFill>
@@ -12921,7 +12913,7 @@
           <a:p>
             <a:r>
               <a:rPr lang="en-US" dirty="0"/>
-              <a:t>Will also do a full-session on introducing you to team software, integrating you to the team and engineering meetings</a:t>
+              <a:t>Will also do a full-session on introducing you to team software, integrating you to the team and engineering meeting times</a:t>
             </a:r>
           </a:p>
         </p:txBody>
@@ -12955,7 +12947,6 @@
                 <a:tint val="98000"/>
               </a:schemeClr>
             </a:duotone>
-            <a:extLst/>
           </a:blip>
           <a:stretch/>
         </a:blipFill>
@@ -14221,7 +14212,7 @@
         <p:spPr>
           <a:xfrm>
             <a:off x="1313895" y="1393794"/>
-            <a:ext cx="7164280" cy="1200329"/>
+            <a:ext cx="7164280" cy="1754326"/>
           </a:xfrm>
           <a:prstGeom prst="rect">
             <a:avLst/>
@@ -14254,6 +14245,15 @@
             <a:r>
               <a:rPr lang="en-US" dirty="0"/>
               <a:t> latest!</a:t>
+            </a:r>
+          </a:p>
+          <a:p>
+            <a:endParaRPr lang="en-US" dirty="0"/>
+          </a:p>
+          <a:p>
+            <a:r>
+              <a:rPr lang="en-US" dirty="0"/>
+              <a:t>Will probably be 400 dollars?</a:t>
             </a:r>
           </a:p>
         </p:txBody>

</xml_diff>